<commit_message>
update project location instructions
</commit_message>
<xml_diff>
--- a/slides/00 - Intro.pptx
+++ b/slides/00 - Intro.pptx
@@ -5,20 +5,21 @@
     <p:sldMasterId id="2147483660" r:id="rId1"/>
   </p:sldMasterIdLst>
   <p:notesMasterIdLst>
-    <p:notesMasterId r:id="rId13"/>
+    <p:notesMasterId r:id="rId14"/>
   </p:notesMasterIdLst>
   <p:sldIdLst>
     <p:sldId id="256" r:id="rId2"/>
     <p:sldId id="355" r:id="rId3"/>
     <p:sldId id="378" r:id="rId4"/>
     <p:sldId id="392" r:id="rId5"/>
-    <p:sldId id="393" r:id="rId6"/>
-    <p:sldId id="394" r:id="rId7"/>
-    <p:sldId id="395" r:id="rId8"/>
-    <p:sldId id="396" r:id="rId9"/>
-    <p:sldId id="397" r:id="rId10"/>
-    <p:sldId id="391" r:id="rId11"/>
-    <p:sldId id="390" r:id="rId12"/>
+    <p:sldId id="398" r:id="rId6"/>
+    <p:sldId id="393" r:id="rId7"/>
+    <p:sldId id="394" r:id="rId8"/>
+    <p:sldId id="395" r:id="rId9"/>
+    <p:sldId id="396" r:id="rId10"/>
+    <p:sldId id="397" r:id="rId11"/>
+    <p:sldId id="391" r:id="rId12"/>
+    <p:sldId id="390" r:id="rId13"/>
   </p:sldIdLst>
   <p:sldSz cx="12192000" cy="6858000"/>
   <p:notesSz cx="6858000" cy="9144000"/>
@@ -207,7 +208,7 @@
           <a:p>
             <a:fld id="{B1A311E3-94BC-8748-A2C2-27EC12D52DD9}" type="datetimeFigureOut">
               <a:rPr lang="en-US" smtClean="0"/>
-              <a:t>4/1/23</a:t>
+              <a:t>4/20/23</a:t>
             </a:fld>
             <a:endParaRPr lang="en-US"/>
           </a:p>
@@ -9801,7 +9802,7 @@
           <a:p>
             <a:fld id="{F4FB47BF-B8E8-4041-8934-87AA6A89E211}" type="datetimeFigureOut">
               <a:rPr lang="en-US" smtClean="0"/>
-              <a:t>4/1/23</a:t>
+              <a:t>4/20/23</a:t>
             </a:fld>
             <a:endParaRPr lang="en-US"/>
           </a:p>
@@ -10008,7 +10009,7 @@
           <a:p>
             <a:fld id="{F4FB47BF-B8E8-4041-8934-87AA6A89E211}" type="datetimeFigureOut">
               <a:rPr lang="en-US" smtClean="0"/>
-              <a:t>4/1/23</a:t>
+              <a:t>4/20/23</a:t>
             </a:fld>
             <a:endParaRPr lang="en-US"/>
           </a:p>
@@ -10188,7 +10189,7 @@
           <a:p>
             <a:fld id="{F4FB47BF-B8E8-4041-8934-87AA6A89E211}" type="datetimeFigureOut">
               <a:rPr lang="en-US" smtClean="0"/>
-              <a:t>4/1/23</a:t>
+              <a:t>4/20/23</a:t>
             </a:fld>
             <a:endParaRPr lang="en-US"/>
           </a:p>
@@ -10764,7 +10765,7 @@
           <a:p>
             <a:fld id="{F4FB47BF-B8E8-4041-8934-87AA6A89E211}" type="datetimeFigureOut">
               <a:rPr lang="en-US" smtClean="0"/>
-              <a:t>4/1/23</a:t>
+              <a:t>4/20/23</a:t>
             </a:fld>
             <a:endParaRPr lang="en-US"/>
           </a:p>
@@ -19662,7 +19663,7 @@
           <a:p>
             <a:fld id="{F4FB47BF-B8E8-4041-8934-87AA6A89E211}" type="datetimeFigureOut">
               <a:rPr lang="en-US" smtClean="0"/>
-              <a:t>4/1/23</a:t>
+              <a:t>4/20/23</a:t>
             </a:fld>
             <a:endParaRPr lang="en-US"/>
           </a:p>
@@ -19936,7 +19937,7 @@
           <a:p>
             <a:fld id="{F4FB47BF-B8E8-4041-8934-87AA6A89E211}" type="datetimeFigureOut">
               <a:rPr lang="en-US" smtClean="0"/>
-              <a:t>4/1/23</a:t>
+              <a:t>4/20/23</a:t>
             </a:fld>
             <a:endParaRPr lang="en-US"/>
           </a:p>
@@ -20334,7 +20335,7 @@
           <a:p>
             <a:fld id="{F4FB47BF-B8E8-4041-8934-87AA6A89E211}" type="datetimeFigureOut">
               <a:rPr lang="en-US" smtClean="0"/>
-              <a:t>4/1/23</a:t>
+              <a:t>4/20/23</a:t>
             </a:fld>
             <a:endParaRPr lang="en-US"/>
           </a:p>
@@ -20452,7 +20453,7 @@
           <a:p>
             <a:fld id="{F4FB47BF-B8E8-4041-8934-87AA6A89E211}" type="datetimeFigureOut">
               <a:rPr lang="en-US" smtClean="0"/>
-              <a:t>4/1/23</a:t>
+              <a:t>4/20/23</a:t>
             </a:fld>
             <a:endParaRPr lang="en-US"/>
           </a:p>
@@ -20547,7 +20548,7 @@
           <a:p>
             <a:fld id="{F4FB47BF-B8E8-4041-8934-87AA6A89E211}" type="datetimeFigureOut">
               <a:rPr lang="en-US" smtClean="0"/>
-              <a:t>4/1/23</a:t>
+              <a:t>4/20/23</a:t>
             </a:fld>
             <a:endParaRPr lang="en-US"/>
           </a:p>
@@ -20837,7 +20838,7 @@
           <a:p>
             <a:fld id="{F4FB47BF-B8E8-4041-8934-87AA6A89E211}" type="datetimeFigureOut">
               <a:rPr lang="en-US" smtClean="0"/>
-              <a:t>4/1/23</a:t>
+              <a:t>4/20/23</a:t>
             </a:fld>
             <a:endParaRPr lang="en-US"/>
           </a:p>
@@ -21117,7 +21118,7 @@
           <a:p>
             <a:fld id="{F4FB47BF-B8E8-4041-8934-87AA6A89E211}" type="datetimeFigureOut">
               <a:rPr lang="en-US" smtClean="0"/>
-              <a:t>4/1/23</a:t>
+              <a:t>4/20/23</a:t>
             </a:fld>
             <a:endParaRPr lang="en-US"/>
           </a:p>
@@ -21367,7 +21368,7 @@
           <a:p>
             <a:fld id="{F4FB47BF-B8E8-4041-8934-87AA6A89E211}" type="datetimeFigureOut">
               <a:rPr lang="en-US" smtClean="0"/>
-              <a:t>4/1/23</a:t>
+              <a:t>4/20/23</a:t>
             </a:fld>
             <a:endParaRPr lang="en-US"/>
           </a:p>
@@ -21960,6 +21961,140 @@
       </p:grpSpPr>
       <p:sp>
         <p:nvSpPr>
+          <p:cNvPr id="2" name="Title 1">
+            <a:extLst>
+              <a:ext uri="{FF2B5EF4-FFF2-40B4-BE49-F238E27FC236}">
+                <a16:creationId xmlns:a16="http://schemas.microsoft.com/office/drawing/2014/main" id="{641EAB07-E04C-24AA-5874-375DA3DF5FB8}"/>
+              </a:ext>
+            </a:extLst>
+          </p:cNvPr>
+          <p:cNvSpPr>
+            <a:spLocks noGrp="1"/>
+          </p:cNvSpPr>
+          <p:nvPr>
+            <p:ph type="title"/>
+          </p:nvPr>
+        </p:nvSpPr>
+        <p:spPr/>
+        <p:txBody>
+          <a:bodyPr/>
+          <a:lstStyle/>
+          <a:p>
+            <a:r>
+              <a:rPr lang="en-US" dirty="0"/>
+              <a:t>Course Setup</a:t>
+            </a:r>
+          </a:p>
+        </p:txBody>
+      </p:sp>
+      <p:sp>
+        <p:nvSpPr>
+          <p:cNvPr id="3" name="Content Placeholder 2">
+            <a:extLst>
+              <a:ext uri="{FF2B5EF4-FFF2-40B4-BE49-F238E27FC236}">
+                <a16:creationId xmlns:a16="http://schemas.microsoft.com/office/drawing/2014/main" id="{2D4BC5CA-4420-3EA2-F7B7-A9AA2655524E}"/>
+              </a:ext>
+            </a:extLst>
+          </p:cNvPr>
+          <p:cNvSpPr>
+            <a:spLocks noGrp="1"/>
+          </p:cNvSpPr>
+          <p:nvPr>
+            <p:ph idx="1"/>
+          </p:nvPr>
+        </p:nvSpPr>
+        <p:spPr/>
+        <p:txBody>
+          <a:bodyPr>
+            <a:normAutofit fontScale="92500" lnSpcReduction="10000"/>
+          </a:bodyPr>
+          <a:lstStyle/>
+          <a:p>
+            <a:pPr marL="742950" indent="-742950">
+              <a:buFont typeface="+mj-lt"/>
+              <a:buAutoNum type="arabicPeriod"/>
+            </a:pPr>
+            <a:r>
+              <a:rPr lang="en-US" sz="4000" dirty="0"/>
+              <a:t>Locate </a:t>
+            </a:r>
+            <a:r>
+              <a:rPr lang="en-US" sz="4000" dirty="0" err="1"/>
+              <a:t>MS_db_data.zip</a:t>
+            </a:r>
+            <a:r>
+              <a:rPr lang="en-US" sz="4000" dirty="0"/>
+              <a:t> (download from pre-course instructions) or re-download</a:t>
+            </a:r>
+          </a:p>
+          <a:p>
+            <a:pPr marL="742950" indent="-742950">
+              <a:buFont typeface="+mj-lt"/>
+              <a:buAutoNum type="arabicPeriod"/>
+            </a:pPr>
+            <a:r>
+              <a:rPr lang="en-US" sz="4000" dirty="0"/>
+              <a:t>Unzip </a:t>
+            </a:r>
+            <a:r>
+              <a:rPr lang="en-US" sz="4000" dirty="0" err="1"/>
+              <a:t>MS_db_data.zip</a:t>
+            </a:r>
+            <a:endParaRPr lang="en-US" sz="4000" dirty="0"/>
+          </a:p>
+          <a:p>
+            <a:pPr marL="742950" indent="-742950">
+              <a:buFont typeface="+mj-lt"/>
+              <a:buAutoNum type="arabicPeriod"/>
+            </a:pPr>
+            <a:r>
+              <a:rPr lang="en-US" sz="4000" dirty="0"/>
+              <a:t>Place unzipped “data” folder into “exercises” folder in your course contents folder</a:t>
+            </a:r>
+          </a:p>
+          <a:p>
+            <a:pPr marL="0" indent="0">
+              <a:buNone/>
+            </a:pPr>
+            <a:r>
+              <a:rPr lang="en-US" sz="4000" dirty="0"/>
+              <a:t>This will be needed to run R Markdown exercises without modification</a:t>
+            </a:r>
+          </a:p>
+        </p:txBody>
+      </p:sp>
+    </p:spTree>
+    <p:extLst>
+      <p:ext uri="{BB962C8B-B14F-4D97-AF65-F5344CB8AC3E}">
+        <p14:creationId xmlns:p14="http://schemas.microsoft.com/office/powerpoint/2010/main" val="945249030"/>
+      </p:ext>
+    </p:extLst>
+  </p:cSld>
+  <p:clrMapOvr>
+    <a:masterClrMapping/>
+  </p:clrMapOvr>
+</p:sld>
+</file>
+
+<file path=ppt/slides/slide11.xml><?xml version="1.0" encoding="utf-8"?>
+<p:sld xmlns:a="http://schemas.openxmlformats.org/drawingml/2006/main" xmlns:r="http://schemas.openxmlformats.org/officeDocument/2006/relationships" xmlns:p="http://schemas.openxmlformats.org/presentationml/2006/main">
+  <p:cSld>
+    <p:spTree>
+      <p:nvGrpSpPr>
+        <p:cNvPr id="1" name=""/>
+        <p:cNvGrpSpPr/>
+        <p:nvPr/>
+      </p:nvGrpSpPr>
+      <p:grpSpPr>
+        <a:xfrm>
+          <a:off x="0" y="0"/>
+          <a:ext cx="0" cy="0"/>
+          <a:chOff x="0" y="0"/>
+          <a:chExt cx="0" cy="0"/>
+        </a:xfrm>
+      </p:grpSpPr>
+      <p:sp>
+        <p:nvSpPr>
           <p:cNvPr id="3" name="Title 2">
             <a:extLst>
               <a:ext uri="{FF2B5EF4-FFF2-40B4-BE49-F238E27FC236}">
@@ -22071,7 +22206,7 @@
 </p:sld>
 </file>
 
-<file path=ppt/slides/slide11.xml><?xml version="1.0" encoding="utf-8"?>
+<file path=ppt/slides/slide12.xml><?xml version="1.0" encoding="utf-8"?>
 <p:sld xmlns:a="http://schemas.openxmlformats.org/drawingml/2006/main" xmlns:r="http://schemas.openxmlformats.org/officeDocument/2006/relationships" xmlns:p="http://schemas.openxmlformats.org/presentationml/2006/main">
   <p:cSld>
     <p:spTree>
@@ -23447,6 +23582,100 @@
           <p:cNvPr id="2" name="Title 1">
             <a:extLst>
               <a:ext uri="{FF2B5EF4-FFF2-40B4-BE49-F238E27FC236}">
+                <a16:creationId xmlns:a16="http://schemas.microsoft.com/office/drawing/2014/main" id="{663FD80C-9A0A-16DE-B368-1DE176F5C124}"/>
+              </a:ext>
+            </a:extLst>
+          </p:cNvPr>
+          <p:cNvSpPr>
+            <a:spLocks noGrp="1"/>
+          </p:cNvSpPr>
+          <p:nvPr>
+            <p:ph type="title"/>
+          </p:nvPr>
+        </p:nvSpPr>
+        <p:spPr/>
+        <p:txBody>
+          <a:bodyPr/>
+          <a:lstStyle/>
+          <a:p>
+            <a:r>
+              <a:rPr lang="en-US" dirty="0"/>
+              <a:t>Course Setup: Project Destination</a:t>
+            </a:r>
+          </a:p>
+        </p:txBody>
+      </p:sp>
+      <p:sp>
+        <p:nvSpPr>
+          <p:cNvPr id="3" name="Content Placeholder 2">
+            <a:extLst>
+              <a:ext uri="{FF2B5EF4-FFF2-40B4-BE49-F238E27FC236}">
+                <a16:creationId xmlns:a16="http://schemas.microsoft.com/office/drawing/2014/main" id="{09A3141C-45E4-9F3E-2F2A-0FCC0B05A6F9}"/>
+              </a:ext>
+            </a:extLst>
+          </p:cNvPr>
+          <p:cNvSpPr>
+            <a:spLocks noGrp="1"/>
+          </p:cNvSpPr>
+          <p:nvPr>
+            <p:ph idx="1"/>
+          </p:nvPr>
+        </p:nvSpPr>
+        <p:spPr/>
+        <p:txBody>
+          <a:bodyPr>
+            <a:normAutofit/>
+          </a:bodyPr>
+          <a:lstStyle/>
+          <a:p>
+            <a:r>
+              <a:rPr lang="en-US" sz="4800" dirty="0"/>
+              <a:t>Put your unzipped folder on a file path without spaces (especially on Windows!)</a:t>
+            </a:r>
+          </a:p>
+          <a:p>
+            <a:r>
+              <a:rPr lang="en-US" sz="4800" dirty="0"/>
+              <a:t>E.g. C:\USERNAME\Desktop\</a:t>
+            </a:r>
+          </a:p>
+        </p:txBody>
+      </p:sp>
+    </p:spTree>
+    <p:extLst>
+      <p:ext uri="{BB962C8B-B14F-4D97-AF65-F5344CB8AC3E}">
+        <p14:creationId xmlns:p14="http://schemas.microsoft.com/office/powerpoint/2010/main" val="4066046192"/>
+      </p:ext>
+    </p:extLst>
+  </p:cSld>
+  <p:clrMapOvr>
+    <a:masterClrMapping/>
+  </p:clrMapOvr>
+</p:sld>
+</file>
+
+<file path=ppt/slides/slide6.xml><?xml version="1.0" encoding="utf-8"?>
+<p:sld xmlns:a="http://schemas.openxmlformats.org/drawingml/2006/main" xmlns:r="http://schemas.openxmlformats.org/officeDocument/2006/relationships" xmlns:p="http://schemas.openxmlformats.org/presentationml/2006/main">
+  <p:cSld>
+    <p:spTree>
+      <p:nvGrpSpPr>
+        <p:cNvPr id="1" name=""/>
+        <p:cNvGrpSpPr/>
+        <p:nvPr/>
+      </p:nvGrpSpPr>
+      <p:grpSpPr>
+        <a:xfrm>
+          <a:off x="0" y="0"/>
+          <a:ext cx="0" cy="0"/>
+          <a:chOff x="0" y="0"/>
+          <a:chExt cx="0" cy="0"/>
+        </a:xfrm>
+      </p:grpSpPr>
+      <p:sp>
+        <p:nvSpPr>
+          <p:cNvPr id="2" name="Title 1">
+            <a:extLst>
+              <a:ext uri="{FF2B5EF4-FFF2-40B4-BE49-F238E27FC236}">
                 <a16:creationId xmlns:a16="http://schemas.microsoft.com/office/drawing/2014/main" id="{75482A62-6096-863A-69B7-18E1148D29B3}"/>
               </a:ext>
             </a:extLst>
@@ -23597,7 +23826,7 @@
 </p:sld>
 </file>
 
-<file path=ppt/slides/slide6.xml><?xml version="1.0" encoding="utf-8"?>
+<file path=ppt/slides/slide7.xml><?xml version="1.0" encoding="utf-8"?>
 <p:sld xmlns:a="http://schemas.openxmlformats.org/drawingml/2006/main" xmlns:r="http://schemas.openxmlformats.org/officeDocument/2006/relationships" xmlns:p="http://schemas.openxmlformats.org/presentationml/2006/main">
   <p:cSld>
     <p:spTree>
@@ -23775,7 +24004,7 @@
 </p:sld>
 </file>
 
-<file path=ppt/slides/slide7.xml><?xml version="1.0" encoding="utf-8"?>
+<file path=ppt/slides/slide8.xml><?xml version="1.0" encoding="utf-8"?>
 <p:sld xmlns:a="http://schemas.openxmlformats.org/drawingml/2006/main" xmlns:r="http://schemas.openxmlformats.org/officeDocument/2006/relationships" xmlns:p="http://schemas.openxmlformats.org/presentationml/2006/main">
   <p:cSld>
     <p:spTree>
@@ -23953,7 +24182,7 @@
 </p:sld>
 </file>
 
-<file path=ppt/slides/slide8.xml><?xml version="1.0" encoding="utf-8"?>
+<file path=ppt/slides/slide9.xml><?xml version="1.0" encoding="utf-8"?>
 <p:sld xmlns:a="http://schemas.openxmlformats.org/drawingml/2006/main" xmlns:r="http://schemas.openxmlformats.org/officeDocument/2006/relationships" xmlns:p="http://schemas.openxmlformats.org/presentationml/2006/main">
   <p:cSld>
     <p:spTree>
@@ -24122,140 +24351,6 @@
     <p:extLst>
       <p:ext uri="{BB962C8B-B14F-4D97-AF65-F5344CB8AC3E}">
         <p14:creationId xmlns:p14="http://schemas.microsoft.com/office/powerpoint/2010/main" val="4254492889"/>
-      </p:ext>
-    </p:extLst>
-  </p:cSld>
-  <p:clrMapOvr>
-    <a:masterClrMapping/>
-  </p:clrMapOvr>
-</p:sld>
-</file>
-
-<file path=ppt/slides/slide9.xml><?xml version="1.0" encoding="utf-8"?>
-<p:sld xmlns:a="http://schemas.openxmlformats.org/drawingml/2006/main" xmlns:r="http://schemas.openxmlformats.org/officeDocument/2006/relationships" xmlns:p="http://schemas.openxmlformats.org/presentationml/2006/main">
-  <p:cSld>
-    <p:spTree>
-      <p:nvGrpSpPr>
-        <p:cNvPr id="1" name=""/>
-        <p:cNvGrpSpPr/>
-        <p:nvPr/>
-      </p:nvGrpSpPr>
-      <p:grpSpPr>
-        <a:xfrm>
-          <a:off x="0" y="0"/>
-          <a:ext cx="0" cy="0"/>
-          <a:chOff x="0" y="0"/>
-          <a:chExt cx="0" cy="0"/>
-        </a:xfrm>
-      </p:grpSpPr>
-      <p:sp>
-        <p:nvSpPr>
-          <p:cNvPr id="2" name="Title 1">
-            <a:extLst>
-              <a:ext uri="{FF2B5EF4-FFF2-40B4-BE49-F238E27FC236}">
-                <a16:creationId xmlns:a16="http://schemas.microsoft.com/office/drawing/2014/main" id="{641EAB07-E04C-24AA-5874-375DA3DF5FB8}"/>
-              </a:ext>
-            </a:extLst>
-          </p:cNvPr>
-          <p:cNvSpPr>
-            <a:spLocks noGrp="1"/>
-          </p:cNvSpPr>
-          <p:nvPr>
-            <p:ph type="title"/>
-          </p:nvPr>
-        </p:nvSpPr>
-        <p:spPr/>
-        <p:txBody>
-          <a:bodyPr/>
-          <a:lstStyle/>
-          <a:p>
-            <a:r>
-              <a:rPr lang="en-US" dirty="0"/>
-              <a:t>Course Setup</a:t>
-            </a:r>
-          </a:p>
-        </p:txBody>
-      </p:sp>
-      <p:sp>
-        <p:nvSpPr>
-          <p:cNvPr id="3" name="Content Placeholder 2">
-            <a:extLst>
-              <a:ext uri="{FF2B5EF4-FFF2-40B4-BE49-F238E27FC236}">
-                <a16:creationId xmlns:a16="http://schemas.microsoft.com/office/drawing/2014/main" id="{2D4BC5CA-4420-3EA2-F7B7-A9AA2655524E}"/>
-              </a:ext>
-            </a:extLst>
-          </p:cNvPr>
-          <p:cNvSpPr>
-            <a:spLocks noGrp="1"/>
-          </p:cNvSpPr>
-          <p:nvPr>
-            <p:ph idx="1"/>
-          </p:nvPr>
-        </p:nvSpPr>
-        <p:spPr/>
-        <p:txBody>
-          <a:bodyPr>
-            <a:normAutofit fontScale="92500" lnSpcReduction="10000"/>
-          </a:bodyPr>
-          <a:lstStyle/>
-          <a:p>
-            <a:pPr marL="742950" indent="-742950">
-              <a:buFont typeface="+mj-lt"/>
-              <a:buAutoNum type="arabicPeriod"/>
-            </a:pPr>
-            <a:r>
-              <a:rPr lang="en-US" sz="4000" dirty="0"/>
-              <a:t>Locate </a:t>
-            </a:r>
-            <a:r>
-              <a:rPr lang="en-US" sz="4000" dirty="0" err="1"/>
-              <a:t>MS_db_data.zip</a:t>
-            </a:r>
-            <a:r>
-              <a:rPr lang="en-US" sz="4000" dirty="0"/>
-              <a:t> (download from pre-course instructions) or re-download</a:t>
-            </a:r>
-          </a:p>
-          <a:p>
-            <a:pPr marL="742950" indent="-742950">
-              <a:buFont typeface="+mj-lt"/>
-              <a:buAutoNum type="arabicPeriod"/>
-            </a:pPr>
-            <a:r>
-              <a:rPr lang="en-US" sz="4000" dirty="0"/>
-              <a:t>Unzip </a:t>
-            </a:r>
-            <a:r>
-              <a:rPr lang="en-US" sz="4000" dirty="0" err="1"/>
-              <a:t>MS_db_data.zip</a:t>
-            </a:r>
-            <a:endParaRPr lang="en-US" sz="4000" dirty="0"/>
-          </a:p>
-          <a:p>
-            <a:pPr marL="742950" indent="-742950">
-              <a:buFont typeface="+mj-lt"/>
-              <a:buAutoNum type="arabicPeriod"/>
-            </a:pPr>
-            <a:r>
-              <a:rPr lang="en-US" sz="4000" dirty="0"/>
-              <a:t>Place unzipped “data” folder into “exercises” folder in your course contents folder</a:t>
-            </a:r>
-          </a:p>
-          <a:p>
-            <a:pPr marL="0" indent="0">
-              <a:buNone/>
-            </a:pPr>
-            <a:r>
-              <a:rPr lang="en-US" sz="4000" dirty="0"/>
-              <a:t>This will be needed to run R Markdown exercises without modification</a:t>
-            </a:r>
-          </a:p>
-        </p:txBody>
-      </p:sp>
-    </p:spTree>
-    <p:extLst>
-      <p:ext uri="{BB962C8B-B14F-4D97-AF65-F5344CB8AC3E}">
-        <p14:creationId xmlns:p14="http://schemas.microsoft.com/office/powerpoint/2010/main" val="945249030"/>
       </p:ext>
     </p:extLst>
   </p:cSld>

</xml_diff>